<commit_message>
Fixed plot "amplitude" axis and cleaned up plotting scripts
</commit_message>
<xml_diff>
--- a/figures/figures.pptx
+++ b/figures/figures.pptx
@@ -2907,7 +2907,7 @@
           <a:p>
             <a:fld id="{8CF8B62D-F47B-43DC-854F-884833B98021}" type="datetimeFigureOut">
               <a:rPr lang="de-DE" smtClean="0"/>
-              <a:t>12.08.2025</a:t>
+              <a:t>14.08.2025</a:t>
             </a:fld>
             <a:endParaRPr lang="de-DE"/>
           </a:p>
@@ -3576,7 +3576,7 @@
           <a:p>
             <a:fld id="{3146589B-F63A-42CD-B487-02649808258F}" type="datetimeFigureOut">
               <a:rPr lang="de-DE" smtClean="0"/>
-              <a:t>12.08.2025</a:t>
+              <a:t>14.08.2025</a:t>
             </a:fld>
             <a:endParaRPr lang="de-DE"/>
           </a:p>
@@ -3776,7 +3776,7 @@
           <a:p>
             <a:fld id="{3146589B-F63A-42CD-B487-02649808258F}" type="datetimeFigureOut">
               <a:rPr lang="de-DE" smtClean="0"/>
-              <a:t>12.08.2025</a:t>
+              <a:t>14.08.2025</a:t>
             </a:fld>
             <a:endParaRPr lang="de-DE"/>
           </a:p>
@@ -3986,7 +3986,7 @@
           <a:p>
             <a:fld id="{3146589B-F63A-42CD-B487-02649808258F}" type="datetimeFigureOut">
               <a:rPr lang="de-DE" smtClean="0"/>
-              <a:t>12.08.2025</a:t>
+              <a:t>14.08.2025</a:t>
             </a:fld>
             <a:endParaRPr lang="de-DE"/>
           </a:p>
@@ -4186,7 +4186,7 @@
           <a:p>
             <a:fld id="{3146589B-F63A-42CD-B487-02649808258F}" type="datetimeFigureOut">
               <a:rPr lang="de-DE" smtClean="0"/>
-              <a:t>12.08.2025</a:t>
+              <a:t>14.08.2025</a:t>
             </a:fld>
             <a:endParaRPr lang="de-DE"/>
           </a:p>
@@ -4462,7 +4462,7 @@
           <a:p>
             <a:fld id="{3146589B-F63A-42CD-B487-02649808258F}" type="datetimeFigureOut">
               <a:rPr lang="de-DE" smtClean="0"/>
-              <a:t>12.08.2025</a:t>
+              <a:t>14.08.2025</a:t>
             </a:fld>
             <a:endParaRPr lang="de-DE"/>
           </a:p>
@@ -4730,7 +4730,7 @@
           <a:p>
             <a:fld id="{3146589B-F63A-42CD-B487-02649808258F}" type="datetimeFigureOut">
               <a:rPr lang="de-DE" smtClean="0"/>
-              <a:t>12.08.2025</a:t>
+              <a:t>14.08.2025</a:t>
             </a:fld>
             <a:endParaRPr lang="de-DE"/>
           </a:p>
@@ -5145,7 +5145,7 @@
           <a:p>
             <a:fld id="{3146589B-F63A-42CD-B487-02649808258F}" type="datetimeFigureOut">
               <a:rPr lang="de-DE" smtClean="0"/>
-              <a:t>12.08.2025</a:t>
+              <a:t>14.08.2025</a:t>
             </a:fld>
             <a:endParaRPr lang="de-DE"/>
           </a:p>
@@ -5287,7 +5287,7 @@
           <a:p>
             <a:fld id="{3146589B-F63A-42CD-B487-02649808258F}" type="datetimeFigureOut">
               <a:rPr lang="de-DE" smtClean="0"/>
-              <a:t>12.08.2025</a:t>
+              <a:t>14.08.2025</a:t>
             </a:fld>
             <a:endParaRPr lang="de-DE"/>
           </a:p>
@@ -5400,7 +5400,7 @@
           <a:p>
             <a:fld id="{3146589B-F63A-42CD-B487-02649808258F}" type="datetimeFigureOut">
               <a:rPr lang="de-DE" smtClean="0"/>
-              <a:t>12.08.2025</a:t>
+              <a:t>14.08.2025</a:t>
             </a:fld>
             <a:endParaRPr lang="de-DE"/>
           </a:p>
@@ -5713,7 +5713,7 @@
           <a:p>
             <a:fld id="{3146589B-F63A-42CD-B487-02649808258F}" type="datetimeFigureOut">
               <a:rPr lang="de-DE" smtClean="0"/>
-              <a:t>12.08.2025</a:t>
+              <a:t>14.08.2025</a:t>
             </a:fld>
             <a:endParaRPr lang="de-DE"/>
           </a:p>
@@ -6002,7 +6002,7 @@
           <a:p>
             <a:fld id="{3146589B-F63A-42CD-B487-02649808258F}" type="datetimeFigureOut">
               <a:rPr lang="de-DE" smtClean="0"/>
-              <a:t>12.08.2025</a:t>
+              <a:t>14.08.2025</a:t>
             </a:fld>
             <a:endParaRPr lang="de-DE"/>
           </a:p>
@@ -6245,7 +6245,7 @@
           <a:p>
             <a:fld id="{3146589B-F63A-42CD-B487-02649808258F}" type="datetimeFigureOut">
               <a:rPr lang="de-DE" smtClean="0"/>
-              <a:t>12.08.2025</a:t>
+              <a:t>14.08.2025</a:t>
             </a:fld>
             <a:endParaRPr lang="de-DE"/>
           </a:p>
@@ -15778,152 +15778,49 @@
           </a:p>
         </p:txBody>
       </p:sp>
-      <mc:AlternateContent xmlns:mc="http://schemas.openxmlformats.org/markup-compatibility/2006" xmlns:a14="http://schemas.microsoft.com/office/drawing/2010/main">
-        <mc:Choice Requires="a14">
-          <p:sp>
-            <p:nvSpPr>
-              <p:cNvPr id="7" name="TextBox 6">
-                <a:extLst>
-                  <a:ext uri="{FF2B5EF4-FFF2-40B4-BE49-F238E27FC236}">
-                    <a16:creationId xmlns:a16="http://schemas.microsoft.com/office/drawing/2014/main" id="{EEEDF624-6410-45CB-FB31-35DAAB234DBE}"/>
-                  </a:ext>
-                </a:extLst>
-              </p:cNvPr>
-              <p:cNvSpPr txBox="1"/>
-              <p:nvPr/>
-            </p:nvSpPr>
-            <p:spPr>
-              <a:xfrm>
-                <a:off x="5041197" y="5216459"/>
-                <a:ext cx="906626" cy="400110"/>
-              </a:xfrm>
-              <a:prstGeom prst="rect">
-                <a:avLst/>
-              </a:prstGeom>
-              <a:noFill/>
-              <a:ln>
-                <a:noFill/>
-              </a:ln>
-            </p:spPr>
-            <p:txBody>
-              <a:bodyPr wrap="square" rtlCol="0">
-                <a:spAutoFit/>
-              </a:bodyPr>
-              <a:lstStyle/>
-              <a:p>
-                <a:pPr/>
-                <a14:m>
-                  <m:oMathPara xmlns:m="http://schemas.openxmlformats.org/officeDocument/2006/math">
-                    <m:oMathParaPr>
-                      <m:jc m:val="centerGroup"/>
-                    </m:oMathParaPr>
-                    <m:oMath xmlns:m="http://schemas.openxmlformats.org/officeDocument/2006/math">
-                      <m:sSub>
-                        <m:sSubPr>
-                          <m:ctrlPr>
-                            <a:rPr lang="de-DE" sz="2000" i="1" smtClean="0">
-                              <a:solidFill>
-                                <a:schemeClr val="tx1"/>
-                              </a:solidFill>
-                              <a:latin typeface="Cambria Math" panose="02040503050406030204" pitchFamily="18" charset="0"/>
-                            </a:rPr>
-                          </m:ctrlPr>
-                        </m:sSubPr>
-                        <m:e>
-                          <m:r>
-                            <m:rPr>
-                              <m:sty m:val="p"/>
-                            </m:rPr>
-                            <a:rPr lang="de-DE" sz="2000" i="1">
-                              <a:solidFill>
-                                <a:schemeClr val="tx1"/>
-                              </a:solidFill>
-                              <a:latin typeface="Cambria Math" panose="02040503050406030204" pitchFamily="18" charset="0"/>
-                            </a:rPr>
-                            <m:t>Δ</m:t>
-                          </m:r>
-                          <m:r>
-                            <a:rPr lang="de-DE" sz="2000" i="1">
-                              <a:solidFill>
-                                <a:schemeClr val="tx1"/>
-                              </a:solidFill>
-                              <a:latin typeface="Cambria Math" panose="02040503050406030204" pitchFamily="18" charset="0"/>
-                            </a:rPr>
-                            <m:t>𝑓</m:t>
-                          </m:r>
-                        </m:e>
-                        <m:sub>
-                          <m:r>
-                            <a:rPr lang="de-DE" sz="2000" b="0" i="1" smtClean="0">
-                              <a:solidFill>
-                                <a:schemeClr val="tx1"/>
-                              </a:solidFill>
-                              <a:latin typeface="Cambria Math" panose="02040503050406030204" pitchFamily="18" charset="0"/>
-                            </a:rPr>
-                            <m:t>𝑥</m:t>
-                          </m:r>
-                        </m:sub>
-                      </m:sSub>
-                    </m:oMath>
-                  </m:oMathPara>
-                </a14:m>
-                <a:endParaRPr lang="de-DE" sz="2000" dirty="0">
-                  <a:solidFill>
-                    <a:schemeClr val="tx1"/>
-                  </a:solidFill>
-                </a:endParaRPr>
-              </a:p>
-            </p:txBody>
-          </p:sp>
-        </mc:Choice>
-        <mc:Fallback xmlns="">
-          <p:sp>
-            <p:nvSpPr>
-              <p:cNvPr id="7" name="TextBox 6">
-                <a:extLst>
-                  <a:ext uri="{FF2B5EF4-FFF2-40B4-BE49-F238E27FC236}">
-                    <a16:creationId xmlns:a16="http://schemas.microsoft.com/office/drawing/2014/main" id="{EEEDF624-6410-45CB-FB31-35DAAB234DBE}"/>
-                  </a:ext>
-                </a:extLst>
-              </p:cNvPr>
-              <p:cNvSpPr txBox="1">
-                <a:spLocks noRot="1" noChangeAspect="1" noMove="1" noResize="1" noEditPoints="1" noAdjustHandles="1" noChangeArrowheads="1" noChangeShapeType="1" noTextEdit="1"/>
-              </p:cNvSpPr>
-              <p:nvPr/>
-            </p:nvSpPr>
-            <p:spPr>
-              <a:xfrm>
-                <a:off x="5041197" y="5216459"/>
-                <a:ext cx="906626" cy="400110"/>
-              </a:xfrm>
-              <a:prstGeom prst="rect">
-                <a:avLst/>
-              </a:prstGeom>
-              <a:blipFill>
-                <a:blip r:embed="rId3"/>
-                <a:stretch>
-                  <a:fillRect b="-15385"/>
-                </a:stretch>
-              </a:blipFill>
-              <a:ln>
-                <a:noFill/>
-              </a:ln>
-            </p:spPr>
-            <p:txBody>
-              <a:bodyPr/>
-              <a:lstStyle/>
-              <a:p>
-                <a:r>
-                  <a:rPr lang="de-DE">
-                    <a:noFill/>
-                  </a:rPr>
-                  <a:t> </a:t>
-                </a:r>
-              </a:p>
-            </p:txBody>
-          </p:sp>
-        </mc:Fallback>
-      </mc:AlternateContent>
+      <p:sp>
+        <p:nvSpPr>
+          <p:cNvPr id="7" name="TextBox 6">
+            <a:extLst>
+              <a:ext uri="{FF2B5EF4-FFF2-40B4-BE49-F238E27FC236}">
+                <a16:creationId xmlns:a16="http://schemas.microsoft.com/office/drawing/2014/main" id="{EEEDF624-6410-45CB-FB31-35DAAB234DBE}"/>
+              </a:ext>
+            </a:extLst>
+          </p:cNvPr>
+          <p:cNvSpPr txBox="1"/>
+          <p:nvPr/>
+        </p:nvSpPr>
+        <p:spPr>
+          <a:xfrm>
+            <a:off x="4245428" y="5216459"/>
+            <a:ext cx="2612571" cy="400110"/>
+          </a:xfrm>
+          <a:prstGeom prst="rect">
+            <a:avLst/>
+          </a:prstGeom>
+          <a:noFill/>
+          <a:ln>
+            <a:noFill/>
+          </a:ln>
+        </p:spPr>
+        <p:txBody>
+          <a:bodyPr wrap="square" rtlCol="0">
+            <a:spAutoFit/>
+          </a:bodyPr>
+          <a:lstStyle/>
+          <a:p>
+            <a:pPr/>
+            <a:r>
+              <a:rPr lang="de-DE" sz="2000" dirty="0">
+                <a:solidFill>
+                  <a:schemeClr val="tx1"/>
+                </a:solidFill>
+              </a:rPr>
+              <a:t>Frequency encoding</a:t>
+            </a:r>
+          </a:p>
+        </p:txBody>
+      </p:sp>
       <p:sp>
         <p:nvSpPr>
           <p:cNvPr id="12" name="Isosceles Triangle 11">
@@ -15982,152 +15879,49 @@
           </a:p>
         </p:txBody>
       </p:sp>
-      <mc:AlternateContent xmlns:mc="http://schemas.openxmlformats.org/markup-compatibility/2006" xmlns:a14="http://schemas.microsoft.com/office/drawing/2010/main">
-        <mc:Choice Requires="a14">
-          <p:sp>
-            <p:nvSpPr>
-              <p:cNvPr id="13" name="TextBox 12">
-                <a:extLst>
-                  <a:ext uri="{FF2B5EF4-FFF2-40B4-BE49-F238E27FC236}">
-                    <a16:creationId xmlns:a16="http://schemas.microsoft.com/office/drawing/2014/main" id="{4F4B2AC8-2F46-741E-3905-985D2E6567EC}"/>
-                  </a:ext>
-                </a:extLst>
-              </p:cNvPr>
-              <p:cNvSpPr txBox="1"/>
-              <p:nvPr/>
-            </p:nvSpPr>
-            <p:spPr>
-              <a:xfrm>
-                <a:off x="3139369" y="3137771"/>
-                <a:ext cx="614655" cy="424283"/>
-              </a:xfrm>
-              <a:prstGeom prst="rect">
-                <a:avLst/>
-              </a:prstGeom>
-              <a:noFill/>
-              <a:ln>
-                <a:noFill/>
-              </a:ln>
-            </p:spPr>
-            <p:txBody>
-              <a:bodyPr wrap="none" rtlCol="0">
-                <a:spAutoFit/>
-              </a:bodyPr>
-              <a:lstStyle/>
-              <a:p>
-                <a:pPr/>
-                <a14:m>
-                  <m:oMathPara xmlns:m="http://schemas.openxmlformats.org/officeDocument/2006/math">
-                    <m:oMathParaPr>
-                      <m:jc m:val="centerGroup"/>
-                    </m:oMathParaPr>
-                    <m:oMath xmlns:m="http://schemas.openxmlformats.org/officeDocument/2006/math">
-                      <m:sSub>
-                        <m:sSubPr>
-                          <m:ctrlPr>
-                            <a:rPr lang="de-DE" sz="2000" i="1" smtClean="0">
-                              <a:solidFill>
-                                <a:schemeClr val="tx1"/>
-                              </a:solidFill>
-                              <a:latin typeface="Cambria Math" panose="02040503050406030204" pitchFamily="18" charset="0"/>
-                            </a:rPr>
-                          </m:ctrlPr>
-                        </m:sSubPr>
-                        <m:e>
-                          <m:r>
-                            <m:rPr>
-                              <m:sty m:val="p"/>
-                            </m:rPr>
-                            <a:rPr lang="de-DE" sz="2000" i="1">
-                              <a:solidFill>
-                                <a:schemeClr val="tx1"/>
-                              </a:solidFill>
-                              <a:latin typeface="Cambria Math" panose="02040503050406030204" pitchFamily="18" charset="0"/>
-                            </a:rPr>
-                            <m:t>Δ</m:t>
-                          </m:r>
-                          <m:r>
-                            <a:rPr lang="de-DE" sz="2000" i="1">
-                              <a:solidFill>
-                                <a:schemeClr val="tx1"/>
-                              </a:solidFill>
-                              <a:latin typeface="Cambria Math" panose="02040503050406030204" pitchFamily="18" charset="0"/>
-                            </a:rPr>
-                            <m:t>𝑓</m:t>
-                          </m:r>
-                        </m:e>
-                        <m:sub>
-                          <m:r>
-                            <a:rPr lang="de-DE" sz="2000" b="0" i="1" smtClean="0">
-                              <a:solidFill>
-                                <a:schemeClr val="tx1"/>
-                              </a:solidFill>
-                              <a:latin typeface="Cambria Math" panose="02040503050406030204" pitchFamily="18" charset="0"/>
-                            </a:rPr>
-                            <m:t>𝑦</m:t>
-                          </m:r>
-                        </m:sub>
-                      </m:sSub>
-                    </m:oMath>
-                  </m:oMathPara>
-                </a14:m>
-                <a:endParaRPr lang="de-DE" sz="2000" dirty="0">
-                  <a:solidFill>
-                    <a:schemeClr val="tx1"/>
-                  </a:solidFill>
-                </a:endParaRPr>
-              </a:p>
-            </p:txBody>
-          </p:sp>
-        </mc:Choice>
-        <mc:Fallback xmlns="">
-          <p:sp>
-            <p:nvSpPr>
-              <p:cNvPr id="13" name="TextBox 12">
-                <a:extLst>
-                  <a:ext uri="{FF2B5EF4-FFF2-40B4-BE49-F238E27FC236}">
-                    <a16:creationId xmlns:a16="http://schemas.microsoft.com/office/drawing/2014/main" id="{4F4B2AC8-2F46-741E-3905-985D2E6567EC}"/>
-                  </a:ext>
-                </a:extLst>
-              </p:cNvPr>
-              <p:cNvSpPr txBox="1">
-                <a:spLocks noRot="1" noChangeAspect="1" noMove="1" noResize="1" noEditPoints="1" noAdjustHandles="1" noChangeArrowheads="1" noChangeShapeType="1" noTextEdit="1"/>
-              </p:cNvSpPr>
-              <p:nvPr/>
-            </p:nvSpPr>
-            <p:spPr>
-              <a:xfrm>
-                <a:off x="3139369" y="3137771"/>
-                <a:ext cx="614655" cy="424283"/>
-              </a:xfrm>
-              <a:prstGeom prst="rect">
-                <a:avLst/>
-              </a:prstGeom>
-              <a:blipFill>
-                <a:blip r:embed="rId4"/>
-                <a:stretch>
-                  <a:fillRect b="-10145"/>
-                </a:stretch>
-              </a:blipFill>
-              <a:ln>
-                <a:noFill/>
-              </a:ln>
-            </p:spPr>
-            <p:txBody>
-              <a:bodyPr/>
-              <a:lstStyle/>
-              <a:p>
-                <a:r>
-                  <a:rPr lang="de-DE">
-                    <a:noFill/>
-                  </a:rPr>
-                  <a:t> </a:t>
-                </a:r>
-              </a:p>
-            </p:txBody>
-          </p:sp>
-        </mc:Fallback>
-      </mc:AlternateContent>
+      <p:sp>
+        <p:nvSpPr>
+          <p:cNvPr id="13" name="TextBox 12">
+            <a:extLst>
+              <a:ext uri="{FF2B5EF4-FFF2-40B4-BE49-F238E27FC236}">
+                <a16:creationId xmlns:a16="http://schemas.microsoft.com/office/drawing/2014/main" id="{4F4B2AC8-2F46-741E-3905-985D2E6567EC}"/>
+              </a:ext>
+            </a:extLst>
+          </p:cNvPr>
+          <p:cNvSpPr txBox="1"/>
+          <p:nvPr/>
+        </p:nvSpPr>
+        <p:spPr>
+          <a:xfrm rot="16200000">
+            <a:off x="2265328" y="3061571"/>
+            <a:ext cx="1944763" cy="400110"/>
+          </a:xfrm>
+          <a:prstGeom prst="rect">
+            <a:avLst/>
+          </a:prstGeom>
+          <a:noFill/>
+          <a:ln>
+            <a:noFill/>
+          </a:ln>
+        </p:spPr>
+        <p:txBody>
+          <a:bodyPr wrap="none" rtlCol="0">
+            <a:spAutoFit/>
+          </a:bodyPr>
+          <a:lstStyle/>
+          <a:p>
+            <a:pPr/>
+            <a:r>
+              <a:rPr lang="de-DE" sz="2000" dirty="0">
+                <a:solidFill>
+                  <a:schemeClr val="tx1"/>
+                </a:solidFill>
+              </a:rPr>
+              <a:t>Phase encoding</a:t>
+            </a:r>
+          </a:p>
+        </p:txBody>
+      </p:sp>
       <p:pic>
         <p:nvPicPr>
           <p:cNvPr id="15" name="Picture 14" descr="A black and white pixelated square&#10;&#10;AI-generated content may be incorrect.">
@@ -16143,7 +15937,7 @@
           <p:nvPr/>
         </p:nvPicPr>
         <p:blipFill>
-          <a:blip r:embed="rId5">
+          <a:blip r:embed="rId3">
             <a:extLst>
               <a:ext uri="{28A0092B-C50C-407E-A947-70E740481C1C}">
                 <a14:useLocalDpi xmlns:a14="http://schemas.microsoft.com/office/drawing/2010/main" val="0"/>
@@ -16196,10 +15990,10 @@
       </p:grpSpPr>
       <p:pic>
         <p:nvPicPr>
-          <p:cNvPr id="6" name="Picture 5" descr="A black and white pixelated square&#10;&#10;AI-generated content may be incorrect.">
+          <p:cNvPr id="3" name="Picture 2" descr="A black and white pixelated square&#10;&#10;AI-generated content may be incorrect.">
             <a:extLst>
               <a:ext uri="{FF2B5EF4-FFF2-40B4-BE49-F238E27FC236}">
-                <a16:creationId xmlns:a16="http://schemas.microsoft.com/office/drawing/2014/main" id="{CAF3C418-B9A2-C4B7-69C0-4E6D32E4194E}"/>
+                <a16:creationId xmlns:a16="http://schemas.microsoft.com/office/drawing/2014/main" id="{951207BA-DE99-FB52-5084-CF79A24650E6}"/>
               </a:ext>
             </a:extLst>
           </p:cNvPr>
@@ -16222,7 +16016,7 @@
         </p:blipFill>
         <p:spPr>
           <a:xfrm>
-            <a:off x="4189353" y="3799857"/>
+            <a:off x="4189353" y="3810743"/>
             <a:ext cx="2877318" cy="2877318"/>
           </a:xfrm>
           <a:prstGeom prst="rect">

</xml_diff>